<commit_message>
added section - Uber's biggest competitors
</commit_message>
<xml_diff>
--- a/Final Presentation.pptx
+++ b/Final Presentation.pptx
@@ -9,12 +9,13 @@
     <p:sldId id="257" r:id="rId3"/>
     <p:sldId id="258" r:id="rId4"/>
     <p:sldId id="259" r:id="rId5"/>
-    <p:sldId id="260" r:id="rId6"/>
-    <p:sldId id="261" r:id="rId7"/>
-    <p:sldId id="262" r:id="rId8"/>
-    <p:sldId id="263" r:id="rId9"/>
-    <p:sldId id="264" r:id="rId10"/>
-    <p:sldId id="265" r:id="rId11"/>
+    <p:sldId id="266" r:id="rId6"/>
+    <p:sldId id="260" r:id="rId7"/>
+    <p:sldId id="261" r:id="rId8"/>
+    <p:sldId id="262" r:id="rId9"/>
+    <p:sldId id="263" r:id="rId10"/>
+    <p:sldId id="264" r:id="rId11"/>
+    <p:sldId id="265" r:id="rId12"/>
   </p:sldIdLst>
   <p:sldSz cx="12192000" cy="6858000"/>
   <p:notesSz cx="6858000" cy="9144000"/>
@@ -113,6 +114,11 @@
       </a:defRPr>
     </a:lvl9pPr>
   </p:defaultTextStyle>
+  <p:extLst>
+    <p:ext uri="{EFAFB233-063F-42B5-8137-9DF3F51BA10A}">
+      <p15:sldGuideLst xmlns:p15="http://schemas.microsoft.com/office/powerpoint/2012/main"/>
+    </p:ext>
+  </p:extLst>
 </p:presentation>
 </file>
 
@@ -391,7 +397,7 @@
             <a:fld id="{9334D819-9F07-4261-B09B-9E467E5D9002}" type="datetimeFigureOut">
               <a:rPr lang="en-US" smtClean="0"/>
               <a:pPr/>
-              <a:t>3/24/2017</a:t>
+              <a:t>3/25/2017</a:t>
             </a:fld>
             <a:endParaRPr lang="en-US" dirty="0"/>
           </a:p>
@@ -812,7 +818,7 @@
             <a:fld id="{9334D819-9F07-4261-B09B-9E467E5D9002}" type="datetimeFigureOut">
               <a:rPr lang="en-US" smtClean="0"/>
               <a:pPr/>
-              <a:t>3/24/2017</a:t>
+              <a:t>3/25/2017</a:t>
             </a:fld>
             <a:endParaRPr lang="en-US" dirty="0"/>
           </a:p>
@@ -1150,7 +1156,7 @@
             <a:fld id="{9334D819-9F07-4261-B09B-9E467E5D9002}" type="datetimeFigureOut">
               <a:rPr lang="en-US" smtClean="0"/>
               <a:pPr/>
-              <a:t>3/24/2017</a:t>
+              <a:t>3/25/2017</a:t>
             </a:fld>
             <a:endParaRPr lang="en-US" dirty="0"/>
           </a:p>
@@ -1557,7 +1563,7 @@
             <a:fld id="{9334D819-9F07-4261-B09B-9E467E5D9002}" type="datetimeFigureOut">
               <a:rPr lang="en-US" smtClean="0"/>
               <a:pPr/>
-              <a:t>3/24/2017</a:t>
+              <a:t>3/25/2017</a:t>
             </a:fld>
             <a:endParaRPr lang="en-US" dirty="0"/>
           </a:p>
@@ -2127,7 +2133,7 @@
             <a:fld id="{9334D819-9F07-4261-B09B-9E467E5D9002}" type="datetimeFigureOut">
               <a:rPr lang="en-US" smtClean="0"/>
               <a:pPr/>
-              <a:t>3/24/2017</a:t>
+              <a:t>3/25/2017</a:t>
             </a:fld>
             <a:endParaRPr lang="en-US" dirty="0"/>
           </a:p>
@@ -2810,7 +2816,7 @@
             <a:fld id="{9334D819-9F07-4261-B09B-9E467E5D9002}" type="datetimeFigureOut">
               <a:rPr lang="en-US" smtClean="0"/>
               <a:pPr/>
-              <a:t>3/24/2017</a:t>
+              <a:t>3/25/2017</a:t>
             </a:fld>
             <a:endParaRPr lang="en-US" dirty="0"/>
           </a:p>
@@ -3725,7 +3731,7 @@
             <a:fld id="{9334D819-9F07-4261-B09B-9E467E5D9002}" type="datetimeFigureOut">
               <a:rPr lang="en-US" smtClean="0"/>
               <a:pPr/>
-              <a:t>3/24/2017</a:t>
+              <a:t>3/25/2017</a:t>
             </a:fld>
             <a:endParaRPr lang="en-US" dirty="0"/>
           </a:p>
@@ -4039,7 +4045,7 @@
           <a:p>
             <a:fld id="{9334D819-9F07-4261-B09B-9E467E5D9002}" type="datetimeFigureOut">
               <a:rPr lang="en-US" smtClean="0"/>
-              <a:t>3/24/2017</a:t>
+              <a:t>3/25/2017</a:t>
             </a:fld>
             <a:endParaRPr lang="en-US" dirty="0"/>
           </a:p>
@@ -4303,7 +4309,7 @@
           <a:p>
             <a:fld id="{9334D819-9F07-4261-B09B-9E467E5D9002}" type="datetimeFigureOut">
               <a:rPr lang="en-US" smtClean="0"/>
-              <a:t>3/24/2017</a:t>
+              <a:t>3/25/2017</a:t>
             </a:fld>
             <a:endParaRPr lang="en-US" dirty="0"/>
           </a:p>
@@ -4631,7 +4637,7 @@
           <a:p>
             <a:fld id="{9334D819-9F07-4261-B09B-9E467E5D9002}" type="datetimeFigureOut">
               <a:rPr lang="en-US" smtClean="0"/>
-              <a:t>3/24/2017</a:t>
+              <a:t>3/25/2017</a:t>
             </a:fld>
             <a:endParaRPr lang="en-US" dirty="0"/>
           </a:p>
@@ -5021,7 +5027,7 @@
             <a:fld id="{9334D819-9F07-4261-B09B-9E467E5D9002}" type="datetimeFigureOut">
               <a:rPr lang="en-US" smtClean="0"/>
               <a:pPr/>
-              <a:t>3/24/2017</a:t>
+              <a:t>3/25/2017</a:t>
             </a:fld>
             <a:endParaRPr lang="en-US" dirty="0"/>
           </a:p>
@@ -5403,7 +5409,7 @@
           <a:p>
             <a:fld id="{9334D819-9F07-4261-B09B-9E467E5D9002}" type="datetimeFigureOut">
               <a:rPr lang="en-US" smtClean="0"/>
-              <a:t>3/24/2017</a:t>
+              <a:t>3/25/2017</a:t>
             </a:fld>
             <a:endParaRPr lang="en-US" dirty="0"/>
           </a:p>
@@ -5914,7 +5920,7 @@
           <a:p>
             <a:fld id="{9334D819-9F07-4261-B09B-9E467E5D9002}" type="datetimeFigureOut">
               <a:rPr lang="en-US" smtClean="0"/>
-              <a:t>3/24/2017</a:t>
+              <a:t>3/25/2017</a:t>
             </a:fld>
             <a:endParaRPr lang="en-US" dirty="0"/>
           </a:p>
@@ -6176,7 +6182,7 @@
           <a:p>
             <a:fld id="{9334D819-9F07-4261-B09B-9E467E5D9002}" type="datetimeFigureOut">
               <a:rPr lang="en-US" smtClean="0"/>
-              <a:t>3/24/2017</a:t>
+              <a:t>3/25/2017</a:t>
             </a:fld>
             <a:endParaRPr lang="en-US" dirty="0"/>
           </a:p>
@@ -6339,7 +6345,7 @@
           <a:p>
             <a:fld id="{9334D819-9F07-4261-B09B-9E467E5D9002}" type="datetimeFigureOut">
               <a:rPr lang="en-US" smtClean="0"/>
-              <a:t>3/24/2017</a:t>
+              <a:t>3/25/2017</a:t>
             </a:fld>
             <a:endParaRPr lang="en-US" dirty="0"/>
           </a:p>
@@ -6734,7 +6740,7 @@
           <a:p>
             <a:fld id="{9334D819-9F07-4261-B09B-9E467E5D9002}" type="datetimeFigureOut">
               <a:rPr lang="en-US" smtClean="0"/>
-              <a:t>3/24/2017</a:t>
+              <a:t>3/25/2017</a:t>
             </a:fld>
             <a:endParaRPr lang="en-US" dirty="0"/>
           </a:p>
@@ -7148,7 +7154,7 @@
           <a:p>
             <a:fld id="{9334D819-9F07-4261-B09B-9E467E5D9002}" type="datetimeFigureOut">
               <a:rPr lang="en-US" smtClean="0"/>
-              <a:t>3/24/2017</a:t>
+              <a:t>3/25/2017</a:t>
             </a:fld>
             <a:endParaRPr lang="en-US" dirty="0"/>
           </a:p>
@@ -7393,7 +7399,7 @@
             <a:fld id="{9334D819-9F07-4261-B09B-9E467E5D9002}" type="datetimeFigureOut">
               <a:rPr lang="en-US" smtClean="0"/>
               <a:pPr/>
-              <a:t>3/24/2017</a:t>
+              <a:t>3/25/2017</a:t>
             </a:fld>
             <a:endParaRPr lang="en-US" dirty="0"/>
           </a:p>
@@ -7973,6 +7979,77 @@
           <a:p>
             <a:r>
               <a:rPr lang="en-PH" dirty="0"/>
+              <a:t>Additional information</a:t>
+            </a:r>
+          </a:p>
+        </p:txBody>
+      </p:sp>
+      <p:sp>
+        <p:nvSpPr>
+          <p:cNvPr id="3" name="Content Placeholder 2"/>
+          <p:cNvSpPr>
+            <a:spLocks noGrp="1"/>
+          </p:cNvSpPr>
+          <p:nvPr>
+            <p:ph idx="1"/>
+          </p:nvPr>
+        </p:nvSpPr>
+        <p:spPr/>
+        <p:txBody>
+          <a:bodyPr/>
+          <a:lstStyle/>
+          <a:p>
+            <a:endParaRPr lang="en-PH"/>
+          </a:p>
+        </p:txBody>
+      </p:sp>
+    </p:spTree>
+    <p:extLst>
+      <p:ext uri="{BB962C8B-B14F-4D97-AF65-F5344CB8AC3E}">
+        <p14:creationId xmlns:p14="http://schemas.microsoft.com/office/powerpoint/2010/main" val="963744372"/>
+      </p:ext>
+    </p:extLst>
+  </p:cSld>
+  <p:clrMapOvr>
+    <a:masterClrMapping/>
+  </p:clrMapOvr>
+</p:sld>
+</file>
+
+<file path=ppt/slides/slide11.xml><?xml version="1.0" encoding="utf-8"?>
+<p:sld xmlns:a="http://schemas.openxmlformats.org/drawingml/2006/main" xmlns:r="http://schemas.openxmlformats.org/officeDocument/2006/relationships" xmlns:p="http://schemas.openxmlformats.org/presentationml/2006/main">
+  <p:cSld>
+    <p:spTree>
+      <p:nvGrpSpPr>
+        <p:cNvPr id="1" name=""/>
+        <p:cNvGrpSpPr/>
+        <p:nvPr/>
+      </p:nvGrpSpPr>
+      <p:grpSpPr>
+        <a:xfrm>
+          <a:off x="0" y="0"/>
+          <a:ext cx="0" cy="0"/>
+          <a:chOff x="0" y="0"/>
+          <a:chExt cx="0" cy="0"/>
+        </a:xfrm>
+      </p:grpSpPr>
+      <p:sp>
+        <p:nvSpPr>
+          <p:cNvPr id="2" name="Title 1"/>
+          <p:cNvSpPr>
+            <a:spLocks noGrp="1"/>
+          </p:cNvSpPr>
+          <p:nvPr>
+            <p:ph type="title"/>
+          </p:nvPr>
+        </p:nvSpPr>
+        <p:spPr/>
+        <p:txBody>
+          <a:bodyPr/>
+          <a:lstStyle/>
+          <a:p>
+            <a:r>
+              <a:rPr lang="en-PH" dirty="0"/>
               <a:t>Recommendation and conclusion</a:t>
             </a:r>
           </a:p>
@@ -8262,8 +8339,13 @@
           <a:p>
             <a:r>
               <a:rPr lang="en-PH" dirty="0"/>
-              <a:t>Features of uber application</a:t>
-            </a:r>
+              <a:t>Uber’s </a:t>
+            </a:r>
+            <a:r>
+              <a:rPr lang="en-PH"/>
+              <a:t>Biggest Competitors</a:t>
+            </a:r>
+            <a:endParaRPr lang="en-PH"/>
           </a:p>
         </p:txBody>
       </p:sp>
@@ -8289,7 +8371,7 @@
     </p:spTree>
     <p:extLst>
       <p:ext uri="{BB962C8B-B14F-4D97-AF65-F5344CB8AC3E}">
-        <p14:creationId xmlns:p14="http://schemas.microsoft.com/office/powerpoint/2010/main" val="4133048969"/>
+        <p14:creationId xmlns:p14="http://schemas.microsoft.com/office/powerpoint/2010/main" val="2116348409"/>
       </p:ext>
     </p:extLst>
   </p:cSld>
@@ -8333,7 +8415,7 @@
           <a:p>
             <a:r>
               <a:rPr lang="en-PH" dirty="0"/>
-              <a:t>How successful is uber now?</a:t>
+              <a:t>Features of uber application</a:t>
             </a:r>
           </a:p>
         </p:txBody>
@@ -8360,7 +8442,7 @@
     </p:spTree>
     <p:extLst>
       <p:ext uri="{BB962C8B-B14F-4D97-AF65-F5344CB8AC3E}">
-        <p14:creationId xmlns:p14="http://schemas.microsoft.com/office/powerpoint/2010/main" val="719457092"/>
+        <p14:creationId xmlns:p14="http://schemas.microsoft.com/office/powerpoint/2010/main" val="4133048969"/>
       </p:ext>
     </p:extLst>
   </p:cSld>
@@ -8404,7 +8486,7 @@
           <a:p>
             <a:r>
               <a:rPr lang="en-PH" dirty="0"/>
-              <a:t>Advantages and disadvantages of using uber application</a:t>
+              <a:t>How successful is uber now?</a:t>
             </a:r>
           </a:p>
         </p:txBody>
@@ -8431,7 +8513,7 @@
     </p:spTree>
     <p:extLst>
       <p:ext uri="{BB962C8B-B14F-4D97-AF65-F5344CB8AC3E}">
-        <p14:creationId xmlns:p14="http://schemas.microsoft.com/office/powerpoint/2010/main" val="3282545285"/>
+        <p14:creationId xmlns:p14="http://schemas.microsoft.com/office/powerpoint/2010/main" val="719457092"/>
       </p:ext>
     </p:extLst>
   </p:cSld>
@@ -8475,7 +8557,7 @@
           <a:p>
             <a:r>
               <a:rPr lang="en-PH" dirty="0"/>
-              <a:t>Reviews from different users</a:t>
+              <a:t>Advantages and disadvantages of using uber application</a:t>
             </a:r>
           </a:p>
         </p:txBody>
@@ -8502,7 +8584,7 @@
     </p:spTree>
     <p:extLst>
       <p:ext uri="{BB962C8B-B14F-4D97-AF65-F5344CB8AC3E}">
-        <p14:creationId xmlns:p14="http://schemas.microsoft.com/office/powerpoint/2010/main" val="2044072226"/>
+        <p14:creationId xmlns:p14="http://schemas.microsoft.com/office/powerpoint/2010/main" val="3282545285"/>
       </p:ext>
     </p:extLst>
   </p:cSld>
@@ -8546,7 +8628,7 @@
           <a:p>
             <a:r>
               <a:rPr lang="en-PH" dirty="0"/>
-              <a:t>Additional information</a:t>
+              <a:t>Reviews from different users</a:t>
             </a:r>
           </a:p>
         </p:txBody>
@@ -8573,7 +8655,7 @@
     </p:spTree>
     <p:extLst>
       <p:ext uri="{BB962C8B-B14F-4D97-AF65-F5344CB8AC3E}">
-        <p14:creationId xmlns:p14="http://schemas.microsoft.com/office/powerpoint/2010/main" val="963744372"/>
+        <p14:creationId xmlns:p14="http://schemas.microsoft.com/office/powerpoint/2010/main" val="2044072226"/>
       </p:ext>
     </p:extLst>
   </p:cSld>

</xml_diff>